<commit_message>
updates to rides (source)
</commit_message>
<xml_diff>
--- a/Taxi-Weather-ERD-20161104.pptx
+++ b/Taxi-Weather-ERD-20161104.pptx
@@ -242,7 +242,7 @@
           <a:p>
             <a:fld id="{243A789B-F390-4516-8E41-B6D2B49252CC}" type="datetimeFigureOut">
               <a:rPr lang="en-US" smtClean="0"/>
-              <a:t>11/12/2016</a:t>
+              <a:t>11/14/2016</a:t>
             </a:fld>
             <a:endParaRPr lang="en-US" dirty="0"/>
           </a:p>
@@ -410,7 +410,7 @@
           <a:p>
             <a:fld id="{243A789B-F390-4516-8E41-B6D2B49252CC}" type="datetimeFigureOut">
               <a:rPr lang="en-US" smtClean="0"/>
-              <a:t>11/12/2016</a:t>
+              <a:t>11/14/2016</a:t>
             </a:fld>
             <a:endParaRPr lang="en-US" dirty="0"/>
           </a:p>
@@ -588,7 +588,7 @@
           <a:p>
             <a:fld id="{243A789B-F390-4516-8E41-B6D2B49252CC}" type="datetimeFigureOut">
               <a:rPr lang="en-US" smtClean="0"/>
-              <a:t>11/12/2016</a:t>
+              <a:t>11/14/2016</a:t>
             </a:fld>
             <a:endParaRPr lang="en-US" dirty="0"/>
           </a:p>
@@ -756,7 +756,7 @@
           <a:p>
             <a:fld id="{243A789B-F390-4516-8E41-B6D2B49252CC}" type="datetimeFigureOut">
               <a:rPr lang="en-US" smtClean="0"/>
-              <a:t>11/12/2016</a:t>
+              <a:t>11/14/2016</a:t>
             </a:fld>
             <a:endParaRPr lang="en-US" dirty="0"/>
           </a:p>
@@ -1001,7 +1001,7 @@
           <a:p>
             <a:fld id="{243A789B-F390-4516-8E41-B6D2B49252CC}" type="datetimeFigureOut">
               <a:rPr lang="en-US" smtClean="0"/>
-              <a:t>11/12/2016</a:t>
+              <a:t>11/14/2016</a:t>
             </a:fld>
             <a:endParaRPr lang="en-US" dirty="0"/>
           </a:p>
@@ -1230,7 +1230,7 @@
           <a:p>
             <a:fld id="{243A789B-F390-4516-8E41-B6D2B49252CC}" type="datetimeFigureOut">
               <a:rPr lang="en-US" smtClean="0"/>
-              <a:t>11/12/2016</a:t>
+              <a:t>11/14/2016</a:t>
             </a:fld>
             <a:endParaRPr lang="en-US" dirty="0"/>
           </a:p>
@@ -1594,7 +1594,7 @@
           <a:p>
             <a:fld id="{243A789B-F390-4516-8E41-B6D2B49252CC}" type="datetimeFigureOut">
               <a:rPr lang="en-US" smtClean="0"/>
-              <a:t>11/12/2016</a:t>
+              <a:t>11/14/2016</a:t>
             </a:fld>
             <a:endParaRPr lang="en-US" dirty="0"/>
           </a:p>
@@ -1711,7 +1711,7 @@
           <a:p>
             <a:fld id="{243A789B-F390-4516-8E41-B6D2B49252CC}" type="datetimeFigureOut">
               <a:rPr lang="en-US" smtClean="0"/>
-              <a:t>11/12/2016</a:t>
+              <a:t>11/14/2016</a:t>
             </a:fld>
             <a:endParaRPr lang="en-US" dirty="0"/>
           </a:p>
@@ -1806,7 +1806,7 @@
           <a:p>
             <a:fld id="{243A789B-F390-4516-8E41-B6D2B49252CC}" type="datetimeFigureOut">
               <a:rPr lang="en-US" smtClean="0"/>
-              <a:t>11/12/2016</a:t>
+              <a:t>11/14/2016</a:t>
             </a:fld>
             <a:endParaRPr lang="en-US" dirty="0"/>
           </a:p>
@@ -2081,7 +2081,7 @@
           <a:p>
             <a:fld id="{243A789B-F390-4516-8E41-B6D2B49252CC}" type="datetimeFigureOut">
               <a:rPr lang="en-US" smtClean="0"/>
-              <a:t>11/12/2016</a:t>
+              <a:t>11/14/2016</a:t>
             </a:fld>
             <a:endParaRPr lang="en-US" dirty="0"/>
           </a:p>
@@ -2333,7 +2333,7 @@
           <a:p>
             <a:fld id="{243A789B-F390-4516-8E41-B6D2B49252CC}" type="datetimeFigureOut">
               <a:rPr lang="en-US" smtClean="0"/>
-              <a:t>11/12/2016</a:t>
+              <a:t>11/14/2016</a:t>
             </a:fld>
             <a:endParaRPr lang="en-US" dirty="0"/>
           </a:p>
@@ -2544,7 +2544,7 @@
           <a:p>
             <a:fld id="{243A789B-F390-4516-8E41-B6D2B49252CC}" type="datetimeFigureOut">
               <a:rPr lang="en-US" smtClean="0"/>
-              <a:t>11/12/2016</a:t>
+              <a:t>11/14/2016</a:t>
             </a:fld>
             <a:endParaRPr lang="en-US" dirty="0"/>
           </a:p>
@@ -3890,7 +3890,6 @@
                         <a:rPr lang="en-US" sz="1000" dirty="0"/>
                         <a:t> </a:t>
                       </a:r>
-                      <a:endParaRPr lang="en-US" sz="1000" dirty="0"/>
                     </a:p>
                   </a:txBody>
                   <a:tcPr/>
@@ -3999,14 +3998,14 @@
           <p:nvPr>
             <p:extLst>
               <p:ext uri="{D42A27DB-BD31-4B8C-83A1-F6EECF244321}">
-                <p14:modId xmlns:p14="http://schemas.microsoft.com/office/powerpoint/2010/main" val="155587488"/>
+                <p14:modId xmlns:p14="http://schemas.microsoft.com/office/powerpoint/2010/main" val="2185250531"/>
               </p:ext>
             </p:extLst>
           </p:nvPr>
         </p:nvGraphicFramePr>
         <p:xfrm>
           <a:off x="10051643" y="285182"/>
-          <a:ext cx="1758768" cy="3992880"/>
+          <a:ext cx="2050832" cy="2621280"/>
         </p:xfrm>
         <a:graphic>
           <a:graphicData uri="http://schemas.openxmlformats.org/drawingml/2006/table">
@@ -4015,14 +4014,14 @@
                 <a:tableStyleId>{5C22544A-7EE6-4342-B048-85BDC9FD1C3A}</a:tableStyleId>
               </a:tblPr>
               <a:tblGrid>
-                <a:gridCol w="1322328">
+                <a:gridCol w="1382975">
                   <a:extLst>
                     <a:ext uri="{9D8B030D-6E8A-4147-A177-3AD203B41FA5}">
                       <a16:colId xmlns:a16="http://schemas.microsoft.com/office/drawing/2014/main" val="2146396053"/>
                     </a:ext>
                   </a:extLst>
                 </a:gridCol>
-                <a:gridCol w="436440">
+                <a:gridCol w="667857">
                   <a:extLst>
                     <a:ext uri="{9D8B030D-6E8A-4147-A177-3AD203B41FA5}">
                       <a16:colId xmlns:a16="http://schemas.microsoft.com/office/drawing/2014/main" val="872119490"/>
@@ -4070,9 +4069,17 @@
                     <a:lstStyle/>
                     <a:p>
                       <a:r>
-                        <a:rPr lang="en-US" sz="1000" dirty="0"/>
+                        <a:rPr lang="en-US" sz="1000" dirty="0" err="1"/>
+                        <a:t>ride_source</a:t>
+                      </a:r>
+                      <a:endParaRPr lang="en-US" sz="1000" dirty="0"/>
+                    </a:p>
+                    <a:p>
+                      <a:r>
+                        <a:rPr lang="en-US" sz="1000" dirty="0" err="1"/>
                         <a:t>passenger_count</a:t>
                       </a:r>
+                      <a:endParaRPr lang="en-US" sz="1000" dirty="0"/>
                     </a:p>
                     <a:p>
                       <a:r>
@@ -4178,8 +4185,15 @@
                     <a:p>
                       <a:r>
                         <a:rPr lang="en-US" sz="1000" dirty="0"/>
+                        <a:t>string</a:t>
+                      </a:r>
+                    </a:p>
+                    <a:p>
+                      <a:r>
+                        <a:rPr lang="en-US" sz="1000" dirty="0" err="1"/>
                         <a:t>int</a:t>
                       </a:r>
+                      <a:endParaRPr lang="en-US" sz="1000" dirty="0"/>
                     </a:p>
                     <a:p>
                       <a:r>
@@ -4375,7 +4389,7 @@
                       </a:pPr>
                       <a:r>
                         <a:rPr lang="en-US" sz="1000" dirty="0"/>
-                        <a:t>decimal</a:t>
+                        <a:t>Decimal</a:t>
                       </a:r>
                     </a:p>
                   </a:txBody>
@@ -4399,7 +4413,7 @@
         </p:nvSpPr>
         <p:spPr>
           <a:xfrm>
-            <a:off x="8716394" y="2963251"/>
+            <a:off x="7940543" y="2963251"/>
             <a:ext cx="2075895" cy="276999"/>
           </a:xfrm>
           <a:prstGeom prst="rect">
@@ -4429,13 +4443,13 @@
           <p:nvPr>
             <p:extLst>
               <p:ext uri="{D42A27DB-BD31-4B8C-83A1-F6EECF244321}">
-                <p14:modId xmlns:p14="http://schemas.microsoft.com/office/powerpoint/2010/main" val="3335883303"/>
+                <p14:modId xmlns:p14="http://schemas.microsoft.com/office/powerpoint/2010/main" val="4075537490"/>
               </p:ext>
             </p:extLst>
           </p:nvPr>
         </p:nvGraphicFramePr>
         <p:xfrm>
-          <a:off x="8716394" y="3233681"/>
+          <a:off x="7940543" y="3233681"/>
           <a:ext cx="2086755" cy="584447"/>
         </p:xfrm>
         <a:graphic>
@@ -4671,7 +4685,7 @@
         </p:nvSpPr>
         <p:spPr>
           <a:xfrm flipH="1">
-            <a:off x="8515715" y="3025391"/>
+            <a:off x="8880522" y="2815481"/>
             <a:ext cx="649446" cy="215444"/>
           </a:xfrm>
           <a:prstGeom prst="rect">
@@ -5991,7 +6005,7 @@
         </p:nvSpPr>
         <p:spPr>
           <a:xfrm>
-            <a:off x="4290634" y="2105507"/>
+            <a:off x="5066543" y="847254"/>
             <a:ext cx="186431" cy="215444"/>
           </a:xfrm>
           <a:prstGeom prst="rect">
@@ -6051,8 +6065,8 @@
         </p:nvCxnSpPr>
         <p:spPr>
           <a:xfrm flipH="1" flipV="1">
-            <a:off x="4126814" y="2155350"/>
-            <a:ext cx="880931" cy="930240"/>
+            <a:off x="5066543" y="952833"/>
+            <a:ext cx="466025" cy="1247538"/>
           </a:xfrm>
           <a:prstGeom prst="line">
             <a:avLst/>
@@ -6080,9 +6094,9 @@
           <p:nvPr/>
         </p:nvSpPr>
         <p:spPr>
-          <a:xfrm>
-            <a:off x="5136202" y="2817746"/>
-            <a:ext cx="186431" cy="215444"/>
+          <a:xfrm flipH="1">
+            <a:off x="5322633" y="1999568"/>
+            <a:ext cx="102873" cy="215444"/>
           </a:xfrm>
           <a:prstGeom prst="rect">
             <a:avLst/>

</xml_diff>